<commit_message>
added beer mug to PPx
</commit_message>
<xml_diff>
--- a/assets/reference/Recipe Grabber for Blokes.pptx
+++ b/assets/reference/Recipe Grabber for Blokes.pptx
@@ -969,6 +969,18 @@
               </a:spcAft>
               <a:buNone/>
             </a:pPr>
+            <a:endParaRPr lang="en-GB" dirty="0"/>
+          </a:p>
+          <a:p>
+            <a:pPr marL="0" lvl="0" indent="0" algn="l" rtl="0">
+              <a:spcBef>
+                <a:spcPts val="0"/>
+              </a:spcBef>
+              <a:spcAft>
+                <a:spcPts val="0"/>
+              </a:spcAft>
+              <a:buNone/>
+            </a:pPr>
             <a:r>
               <a:rPr lang="en-GB" dirty="0"/>
               <a:t>Toby: I enjoy cooking but sometimes I can lack inspiration for new ideas, and this app helps solve that problem</a:t>
@@ -984,6 +996,18 @@
               </a:spcAft>
               <a:buNone/>
             </a:pPr>
+            <a:endParaRPr lang="en-GB" dirty="0"/>
+          </a:p>
+          <a:p>
+            <a:pPr marL="0" lvl="0" indent="0" algn="l" rtl="0">
+              <a:spcBef>
+                <a:spcPts val="0"/>
+              </a:spcBef>
+              <a:spcAft>
+                <a:spcPts val="0"/>
+              </a:spcAft>
+              <a:buNone/>
+            </a:pPr>
             <a:r>
               <a:rPr lang="en-GB" dirty="0"/>
               <a:t>Shane: As a single parent, I’m often looking at new and exciting recipes for the type of food that my kids enjoy. This app gives me the ability to change things up in the kitchen whilst also ensuring that my kids don’t get sick of me cooking the same old thing</a:t>
@@ -1015,6 +1039,18 @@
               <a:rPr lang="en-GB" dirty="0"/>
               <a:t>User Story:</a:t>
             </a:r>
+          </a:p>
+          <a:p>
+            <a:pPr marL="0" lvl="0" indent="0" algn="l" rtl="0">
+              <a:spcBef>
+                <a:spcPts val="0"/>
+              </a:spcBef>
+              <a:spcAft>
+                <a:spcPts val="0"/>
+              </a:spcAft>
+              <a:buNone/>
+            </a:pPr>
+            <a:endParaRPr lang="en-GB" dirty="0"/>
           </a:p>
           <a:p>
             <a:pPr marL="0" lvl="0" indent="0" algn="l" rtl="0">
@@ -1033,25 +1069,7 @@
                 <a:ea typeface="Calibri" panose="020F0502020204030204" pitchFamily="34" charset="0"/>
                 <a:cs typeface="Times New Roman" panose="02020603050405020304" pitchFamily="18" charset="0"/>
               </a:rPr>
-              <a:t>As a bloke trying to cook dinner from </a:t>
-            </a:r>
-            <a:r>
-              <a:rPr lang="en-GB" sz="1800" dirty="0" err="1">
-                <a:effectLst/>
-                <a:latin typeface="Calibri" panose="020F0502020204030204" pitchFamily="34" charset="0"/>
-                <a:ea typeface="Calibri" panose="020F0502020204030204" pitchFamily="34" charset="0"/>
-                <a:cs typeface="Times New Roman" panose="02020603050405020304" pitchFamily="18" charset="0"/>
-              </a:rPr>
-              <a:t>whats</a:t>
-            </a:r>
-            <a:r>
-              <a:rPr lang="en-GB" sz="1800" dirty="0">
-                <a:effectLst/>
-                <a:latin typeface="Calibri" panose="020F0502020204030204" pitchFamily="34" charset="0"/>
-                <a:ea typeface="Calibri" panose="020F0502020204030204" pitchFamily="34" charset="0"/>
-                <a:cs typeface="Times New Roman" panose="02020603050405020304" pitchFamily="18" charset="0"/>
-              </a:rPr>
-              <a:t> in the cupboard ;</a:t>
+              <a:t>As a bloke trying to cook dinner from what’s in the cupboard ;</a:t>
             </a:r>
           </a:p>
           <a:p>
@@ -1105,31 +1123,13 @@
               <a:buNone/>
             </a:pPr>
             <a:r>
-              <a:rPr lang="en-GB" sz="1800">
-                <a:effectLst/>
-                <a:latin typeface="Calibri" panose="020F0502020204030204" pitchFamily="34" charset="0"/>
-                <a:ea typeface="Calibri" panose="020F0502020204030204" pitchFamily="34" charset="0"/>
-                <a:cs typeface="Times New Roman" panose="02020603050405020304" pitchFamily="18" charset="0"/>
-              </a:rPr>
-              <a:t>Then </a:t>
-            </a:r>
-            <a:r>
               <a:rPr lang="en-GB" sz="1800" dirty="0">
                 <a:effectLst/>
                 <a:latin typeface="Calibri" panose="020F0502020204030204" pitchFamily="34" charset="0"/>
                 <a:ea typeface="Calibri" panose="020F0502020204030204" pitchFamily="34" charset="0"/>
                 <a:cs typeface="Times New Roman" panose="02020603050405020304" pitchFamily="18" charset="0"/>
               </a:rPr>
-              <a:t>it </a:t>
-            </a:r>
-            <a:r>
-              <a:rPr lang="en-GB" sz="1800">
-                <a:effectLst/>
-                <a:latin typeface="Calibri" panose="020F0502020204030204" pitchFamily="34" charset="0"/>
-                <a:ea typeface="Calibri" panose="020F0502020204030204" pitchFamily="34" charset="0"/>
-                <a:cs typeface="Times New Roman" panose="02020603050405020304" pitchFamily="18" charset="0"/>
-              </a:rPr>
-              <a:t>looks And tastes desirable</a:t>
+              <a:t>Then it looks And tastes desirable</a:t>
             </a:r>
           </a:p>
           <a:p>
@@ -1292,6 +1292,68 @@
               </a:spcAft>
               <a:buNone/>
             </a:pPr>
+            <a:r>
+              <a:rPr lang="en-GB" dirty="0"/>
+              <a:t>API calls to </a:t>
+            </a:r>
+            <a:r>
+              <a:rPr lang="en-GB" dirty="0" err="1"/>
+              <a:t>Spoonacular</a:t>
+            </a:r>
+            <a:r>
+              <a:rPr lang="en-GB" dirty="0"/>
+              <a:t> for both recipe information &amp; a second call to grab ingredients for a chosen </a:t>
+            </a:r>
+            <a:br>
+              <a:rPr lang="en-GB" dirty="0"/>
+            </a:br>
+            <a:r>
+              <a:rPr lang="en-GB" dirty="0"/>
+              <a:t>API calls to </a:t>
+            </a:r>
+            <a:r>
+              <a:rPr lang="en-GB" dirty="0" err="1"/>
+              <a:t>unsplash</a:t>
+            </a:r>
+            <a:r>
+              <a:rPr lang="en-GB" dirty="0"/>
+              <a:t> for some lovely imagery</a:t>
+            </a:r>
+          </a:p>
+          <a:p>
+            <a:pPr marL="0" lvl="0" indent="0" algn="l" rtl="0">
+              <a:spcBef>
+                <a:spcPts val="0"/>
+              </a:spcBef>
+              <a:spcAft>
+                <a:spcPts val="0"/>
+              </a:spcAft>
+              <a:buNone/>
+            </a:pPr>
+            <a:endParaRPr lang="en-GB" dirty="0"/>
+          </a:p>
+          <a:p>
+            <a:pPr marL="0" lvl="0" indent="0" algn="l" rtl="0">
+              <a:spcBef>
+                <a:spcPts val="0"/>
+              </a:spcBef>
+              <a:spcAft>
+                <a:spcPts val="0"/>
+              </a:spcAft>
+              <a:buNone/>
+            </a:pPr>
+            <a:endParaRPr lang="en-GB" dirty="0"/>
+          </a:p>
+          <a:p>
+            <a:pPr marL="0" lvl="0" indent="0" algn="l" rtl="0">
+              <a:spcBef>
+                <a:spcPts val="0"/>
+              </a:spcBef>
+              <a:spcAft>
+                <a:spcPts val="0"/>
+              </a:spcAft>
+              <a:buNone/>
+            </a:pPr>
             <a:endParaRPr lang="en-GB" dirty="0"/>
           </a:p>
           <a:p>
@@ -1730,7 +1792,7 @@
               <a:rPr lang="en-GB" dirty="0">
                 <a:sym typeface="Wingdings" panose="05000000000000000000" pitchFamily="2" charset="2"/>
               </a:rPr>
-              <a:t>Do another search  show adding a different favourite or several</a:t>
+              <a:t>Do another search  show adding a different favourite or several meals to favourites</a:t>
             </a:r>
           </a:p>
           <a:p>
@@ -1923,6 +1985,39 @@
                 <a:sym typeface="Wingdings" panose="05000000000000000000" pitchFamily="2" charset="2"/>
               </a:rPr>
               <a:t>**show code maybe how the object saves to local storage etc**</a:t>
+            </a:r>
+          </a:p>
+          <a:p>
+            <a:pPr marL="0" lvl="0" indent="0" algn="l" rtl="0">
+              <a:spcBef>
+                <a:spcPts val="0"/>
+              </a:spcBef>
+              <a:spcAft>
+                <a:spcPts val="0"/>
+              </a:spcAft>
+              <a:buFont typeface="Wingdings" panose="05000000000000000000" pitchFamily="2" charset="2"/>
+              <a:buNone/>
+            </a:pPr>
+            <a:endParaRPr lang="en-GB" dirty="0">
+              <a:sym typeface="Wingdings" panose="05000000000000000000" pitchFamily="2" charset="2"/>
+            </a:endParaRPr>
+          </a:p>
+          <a:p>
+            <a:pPr marL="0" lvl="0" indent="0" algn="l" rtl="0">
+              <a:spcBef>
+                <a:spcPts val="0"/>
+              </a:spcBef>
+              <a:spcAft>
+                <a:spcPts val="0"/>
+              </a:spcAft>
+              <a:buFont typeface="Wingdings" panose="05000000000000000000" pitchFamily="2" charset="2"/>
+              <a:buNone/>
+            </a:pPr>
+            <a:r>
+              <a:rPr lang="en-GB" dirty="0">
+                <a:sym typeface="Wingdings" panose="05000000000000000000" pitchFamily="2" charset="2"/>
+              </a:rPr>
+              <a:t>Ask for any questions</a:t>
             </a:r>
           </a:p>
         </p:txBody>
@@ -2131,7 +2226,17 @@
               </a:spcAft>
               <a:buNone/>
             </a:pPr>
-            <a:endParaRPr/>
+            <a:r>
+              <a:rPr lang="en-GB" dirty="0"/>
+              <a:t>Maybe launch recipe grabber for birds at a later date  </a:t>
+            </a:r>
+            <a:r>
+              <a:rPr lang="en-GB" dirty="0">
+                <a:sym typeface="Wingdings" panose="05000000000000000000" pitchFamily="2" charset="2"/>
+              </a:rPr>
+              <a:t></a:t>
+            </a:r>
+            <a:endParaRPr dirty="0"/>
           </a:p>
         </p:txBody>
       </p:sp>
@@ -2335,7 +2440,7 @@
             <a:fld id="{B61BEF0D-F0BB-DE4B-95CE-6DB70DBA9567}" type="datetimeFigureOut">
               <a:rPr lang="en-US" dirty="0"/>
               <a:pPr/>
-              <a:t>2/7/2023</a:t>
+              <a:t>2/8/2023</a:t>
             </a:fld>
             <a:endParaRPr lang="en-US" dirty="0"/>
           </a:p>
@@ -2782,7 +2887,7 @@
             <a:fld id="{B61BEF0D-F0BB-DE4B-95CE-6DB70DBA9567}" type="datetimeFigureOut">
               <a:rPr lang="en-US" dirty="0"/>
               <a:pPr/>
-              <a:t>2/7/2023</a:t>
+              <a:t>2/8/2023</a:t>
             </a:fld>
             <a:endParaRPr lang="en-US" dirty="0"/>
           </a:p>
@@ -3043,7 +3148,7 @@
             <a:fld id="{B61BEF0D-F0BB-DE4B-95CE-6DB70DBA9567}" type="datetimeFigureOut">
               <a:rPr lang="en-US" dirty="0"/>
               <a:pPr/>
-              <a:t>2/7/2023</a:t>
+              <a:t>2/8/2023</a:t>
             </a:fld>
             <a:endParaRPr lang="en-US" dirty="0"/>
           </a:p>
@@ -3362,7 +3467,7 @@
             <a:fld id="{B61BEF0D-F0BB-DE4B-95CE-6DB70DBA9567}" type="datetimeFigureOut">
               <a:rPr lang="en-US" dirty="0"/>
               <a:pPr/>
-              <a:t>2/7/2023</a:t>
+              <a:t>2/8/2023</a:t>
             </a:fld>
             <a:endParaRPr lang="en-US" dirty="0"/>
           </a:p>
@@ -3691,7 +3796,7 @@
             <a:fld id="{B61BEF0D-F0BB-DE4B-95CE-6DB70DBA9567}" type="datetimeFigureOut">
               <a:rPr lang="en-US" dirty="0"/>
               <a:pPr/>
-              <a:t>2/7/2023</a:t>
+              <a:t>2/8/2023</a:t>
             </a:fld>
             <a:endParaRPr lang="en-US" dirty="0"/>
           </a:p>
@@ -4004,7 +4109,7 @@
             <a:fld id="{B61BEF0D-F0BB-DE4B-95CE-6DB70DBA9567}" type="datetimeFigureOut">
               <a:rPr lang="en-US" dirty="0"/>
               <a:pPr/>
-              <a:t>2/7/2023</a:t>
+              <a:t>2/8/2023</a:t>
             </a:fld>
             <a:endParaRPr lang="en-US" dirty="0"/>
           </a:p>
@@ -4382,7 +4487,7 @@
             <a:fld id="{B61BEF0D-F0BB-DE4B-95CE-6DB70DBA9567}" type="datetimeFigureOut">
               <a:rPr lang="en-US" dirty="0"/>
               <a:pPr/>
-              <a:t>2/7/2023</a:t>
+              <a:t>2/8/2023</a:t>
             </a:fld>
             <a:endParaRPr lang="en-US" dirty="0"/>
           </a:p>
@@ -4567,7 +4672,7 @@
             <a:fld id="{B61BEF0D-F0BB-DE4B-95CE-6DB70DBA9567}" type="datetimeFigureOut">
               <a:rPr lang="en-US" dirty="0"/>
               <a:pPr/>
-              <a:t>2/7/2023</a:t>
+              <a:t>2/8/2023</a:t>
             </a:fld>
             <a:endParaRPr lang="en-US" dirty="0"/>
           </a:p>
@@ -4758,7 +4863,7 @@
             <a:fld id="{B61BEF0D-F0BB-DE4B-95CE-6DB70DBA9567}" type="datetimeFigureOut">
               <a:rPr lang="en-US" dirty="0"/>
               <a:pPr/>
-              <a:t>2/7/2023</a:t>
+              <a:t>2/8/2023</a:t>
             </a:fld>
             <a:endParaRPr lang="en-US" dirty="0"/>
           </a:p>
@@ -5544,7 +5649,7 @@
             <a:fld id="{B61BEF0D-F0BB-DE4B-95CE-6DB70DBA9567}" type="datetimeFigureOut">
               <a:rPr lang="en-US" dirty="0"/>
               <a:pPr/>
-              <a:t>2/7/2023</a:t>
+              <a:t>2/8/2023</a:t>
             </a:fld>
             <a:endParaRPr lang="en-US" dirty="0"/>
           </a:p>
@@ -5805,7 +5910,7 @@
             <a:fld id="{B61BEF0D-F0BB-DE4B-95CE-6DB70DBA9567}" type="datetimeFigureOut">
               <a:rPr lang="en-US" dirty="0"/>
               <a:pPr/>
-              <a:t>2/7/2023</a:t>
+              <a:t>2/8/2023</a:t>
             </a:fld>
             <a:endParaRPr lang="en-US" dirty="0"/>
           </a:p>
@@ -6052,7 +6157,7 @@
             <a:fld id="{B61BEF0D-F0BB-DE4B-95CE-6DB70DBA9567}" type="datetimeFigureOut">
               <a:rPr lang="en-US" dirty="0"/>
               <a:pPr/>
-              <a:t>2/7/2023</a:t>
+              <a:t>2/8/2023</a:t>
             </a:fld>
             <a:endParaRPr lang="en-US" dirty="0"/>
           </a:p>
@@ -6445,7 +6550,7 @@
             <a:fld id="{B61BEF0D-F0BB-DE4B-95CE-6DB70DBA9567}" type="datetimeFigureOut">
               <a:rPr lang="en-US" dirty="0"/>
               <a:pPr/>
-              <a:t>2/7/2023</a:t>
+              <a:t>2/8/2023</a:t>
             </a:fld>
             <a:endParaRPr lang="en-US" dirty="0"/>
           </a:p>
@@ -6574,7 +6679,7 @@
             <a:fld id="{B61BEF0D-F0BB-DE4B-95CE-6DB70DBA9567}" type="datetimeFigureOut">
               <a:rPr lang="en-US" dirty="0"/>
               <a:pPr/>
-              <a:t>2/7/2023</a:t>
+              <a:t>2/8/2023</a:t>
             </a:fld>
             <a:endParaRPr lang="en-US" dirty="0"/>
           </a:p>
@@ -6680,7 +6785,7 @@
             <a:fld id="{B61BEF0D-F0BB-DE4B-95CE-6DB70DBA9567}" type="datetimeFigureOut">
               <a:rPr lang="en-US" dirty="0"/>
               <a:pPr/>
-              <a:t>2/7/2023</a:t>
+              <a:t>2/8/2023</a:t>
             </a:fld>
             <a:endParaRPr lang="en-US" dirty="0"/>
           </a:p>
@@ -6945,7 +7050,7 @@
             <a:fld id="{B61BEF0D-F0BB-DE4B-95CE-6DB70DBA9567}" type="datetimeFigureOut">
               <a:rPr lang="en-US" dirty="0"/>
               <a:pPr/>
-              <a:t>2/7/2023</a:t>
+              <a:t>2/8/2023</a:t>
             </a:fld>
             <a:endParaRPr lang="en-US" dirty="0"/>
           </a:p>
@@ -7239,7 +7344,7 @@
             <a:fld id="{B61BEF0D-F0BB-DE4B-95CE-6DB70DBA9567}" type="datetimeFigureOut">
               <a:rPr lang="en-US" dirty="0"/>
               <a:pPr/>
-              <a:t>2/7/2023</a:t>
+              <a:t>2/8/2023</a:t>
             </a:fld>
             <a:endParaRPr lang="en-US" dirty="0"/>
           </a:p>
@@ -7656,7 +7761,7 @@
             <a:fld id="{B61BEF0D-F0BB-DE4B-95CE-6DB70DBA9567}" type="datetimeFigureOut">
               <a:rPr lang="en-US" dirty="0"/>
               <a:pPr/>
-              <a:t>2/7/2023</a:t>
+              <a:t>2/8/2023</a:t>
             </a:fld>
             <a:endParaRPr lang="en-US" dirty="0"/>
           </a:p>
@@ -8334,14 +8439,108 @@
               <a:buNone/>
             </a:pPr>
             <a:r>
-              <a:rPr lang="en" dirty="0"/>
+              <a:rPr lang="en" sz="2400" dirty="0"/>
               <a:t>“</a:t>
             </a:r>
             <a:r>
-              <a:rPr lang="en" i="1" dirty="0"/>
-              <a:t>THE ULTIMATE RECIPE APP THAT WILL LEAVE YOU WONDERING WHERE ITS BEEN ALL YOUR LIFE”</a:t>
-            </a:r>
-            <a:endParaRPr dirty="0"/>
+              <a:rPr lang="en-GB" sz="2400" b="0" i="0" dirty="0">
+                <a:solidFill>
+                  <a:srgbClr val="D1D2D3"/>
+                </a:solidFill>
+                <a:effectLst/>
+                <a:latin typeface="Slack-Lato"/>
+              </a:rPr>
+              <a:t>Since time immemorial, one thing has plagued man…</a:t>
+            </a:r>
+            <a:br>
+              <a:rPr lang="en-GB" sz="2400" b="0" i="0" dirty="0">
+                <a:solidFill>
+                  <a:srgbClr val="D1D2D3"/>
+                </a:solidFill>
+                <a:effectLst/>
+                <a:latin typeface="Slack-Lato"/>
+              </a:rPr>
+            </a:br>
+            <a:r>
+              <a:rPr lang="en-GB" sz="2400" b="0" i="0" dirty="0">
+                <a:solidFill>
+                  <a:srgbClr val="D1D2D3"/>
+                </a:solidFill>
+                <a:effectLst/>
+                <a:latin typeface="Slack-Lato"/>
+              </a:rPr>
+              <a:t> What to make for dinner ??!!</a:t>
+            </a:r>
+            <a:br>
+              <a:rPr lang="en-GB" sz="2400" dirty="0"/>
+            </a:br>
+            <a:r>
+              <a:rPr lang="en-GB" sz="2400" b="0" i="0" dirty="0">
+                <a:solidFill>
+                  <a:srgbClr val="D1D2D3"/>
+                </a:solidFill>
+                <a:effectLst/>
+                <a:latin typeface="Slack-Lato"/>
+              </a:rPr>
+              <a:t>That’s why we are here today to present to you the “</a:t>
+            </a:r>
+            <a:r>
+              <a:rPr lang="en-GB" b="0" i="0" dirty="0">
+                <a:solidFill>
+                  <a:srgbClr val="D1D2D3"/>
+                </a:solidFill>
+                <a:effectLst/>
+                <a:latin typeface="Slack-Lato"/>
+              </a:rPr>
+              <a:t>Recipe Grabber for Blokes</a:t>
+            </a:r>
+            <a:r>
+              <a:rPr lang="en-GB" sz="2400" b="0" i="0" dirty="0">
+                <a:solidFill>
+                  <a:srgbClr val="D1D2D3"/>
+                </a:solidFill>
+                <a:effectLst/>
+                <a:latin typeface="Slack-Lato"/>
+              </a:rPr>
+              <a:t>”.</a:t>
+            </a:r>
+            <a:br>
+              <a:rPr lang="en-GB" sz="2400" dirty="0"/>
+            </a:br>
+            <a:r>
+              <a:rPr lang="en-GB" sz="2400" b="0" i="0" dirty="0">
+                <a:solidFill>
+                  <a:srgbClr val="D1D2D3"/>
+                </a:solidFill>
+                <a:effectLst/>
+                <a:latin typeface="Slack-Lato"/>
+              </a:rPr>
+              <a:t>Our revolutionary state of the art application will leave you wondering how you’ve managed to live your life without it. </a:t>
+            </a:r>
+            <a:br>
+              <a:rPr lang="en-GB" sz="2400" b="0" i="0" dirty="0">
+                <a:solidFill>
+                  <a:srgbClr val="D1D2D3"/>
+                </a:solidFill>
+                <a:effectLst/>
+                <a:latin typeface="Slack-Lato"/>
+              </a:rPr>
+            </a:br>
+            <a:r>
+              <a:rPr lang="en-GB" sz="2400" b="0" i="0" dirty="0">
+                <a:solidFill>
+                  <a:srgbClr val="D1D2D3"/>
+                </a:solidFill>
+                <a:effectLst/>
+                <a:latin typeface="Slack-Lato"/>
+              </a:rPr>
+              <a:t>No longer will you spend minutes, hours, or even days trying to think up that perfect meal to cook</a:t>
+            </a:r>
+            <a:r>
+              <a:rPr lang="en" sz="2400" i="1" dirty="0"/>
+              <a:t>”</a:t>
+            </a:r>
+            <a:endParaRPr sz="2400" dirty="0"/>
           </a:p>
         </p:txBody>
       </p:sp>

</xml_diff>

<commit_message>
added beer mug to PP
</commit_message>
<xml_diff>
--- a/assets/reference/Recipe Grabber for Blokes.pptx
+++ b/assets/reference/Recipe Grabber for Blokes.pptx
@@ -8419,6 +8419,10 @@
           </p:nvPr>
         </p:nvSpPr>
         <p:spPr>
+          <a:xfrm>
+            <a:off x="19205" y="2203077"/>
+            <a:ext cx="8520600" cy="841800"/>
+          </a:xfrm>
           <a:prstGeom prst="rect">
             <a:avLst/>
           </a:prstGeom>
@@ -8482,7 +8486,7 @@
                 <a:effectLst/>
                 <a:latin typeface="Slack-Lato"/>
               </a:rPr>
-              <a:t>That’s why we are here today to present to you the “</a:t>
+              <a:t>That’s why we are here today to present to you the </a:t>
             </a:r>
             <a:r>
               <a:rPr lang="en-GB" b="0" i="0" dirty="0">
@@ -8492,7 +8496,7 @@
                 <a:effectLst/>
                 <a:latin typeface="Slack-Lato"/>
               </a:rPr>
-              <a:t>Recipe Grabber for Blokes</a:t>
+              <a:t>“Recipe Grabber for Blokes”</a:t>
             </a:r>
             <a:r>
               <a:rPr lang="en-GB" sz="2400" b="0" i="0" dirty="0">
@@ -8502,7 +8506,7 @@
                 <a:effectLst/>
                 <a:latin typeface="Slack-Lato"/>
               </a:rPr>
-              <a:t>”.</a:t>
+              <a:t>.</a:t>
             </a:r>
             <a:br>
               <a:rPr lang="en-GB" sz="2400" dirty="0"/>
@@ -8544,6 +8548,42 @@
           </a:p>
         </p:txBody>
       </p:sp>
+      <p:pic>
+        <p:nvPicPr>
+          <p:cNvPr id="3" name="Graphic 2">
+            <a:extLst>
+              <a:ext uri="{FF2B5EF4-FFF2-40B4-BE49-F238E27FC236}">
+                <a16:creationId xmlns:a16="http://schemas.microsoft.com/office/drawing/2014/main" id="{5662430E-BE6C-7B53-3228-4E00AA885442}"/>
+              </a:ext>
+            </a:extLst>
+          </p:cNvPr>
+          <p:cNvPicPr>
+            <a:picLocks noChangeAspect="1"/>
+          </p:cNvPicPr>
+          <p:nvPr/>
+        </p:nvPicPr>
+        <p:blipFill>
+          <a:blip r:embed="rId3">
+            <a:extLst>
+              <a:ext uri="{96DAC541-7B7A-43D3-8B79-37D633B846F1}">
+                <asvg:svgBlip xmlns:asvg="http://schemas.microsoft.com/office/drawing/2016/SVG/main" r:embed="rId4"/>
+              </a:ext>
+            </a:extLst>
+          </a:blip>
+          <a:stretch>
+            <a:fillRect/>
+          </a:stretch>
+        </p:blipFill>
+        <p:spPr>
+          <a:xfrm>
+            <a:off x="7367665" y="2003989"/>
+            <a:ext cx="398176" cy="398176"/>
+          </a:xfrm>
+          <a:prstGeom prst="rect">
+            <a:avLst/>
+          </a:prstGeom>
+        </p:spPr>
+      </p:pic>
     </p:spTree>
   </p:cSld>
   <p:clrMapOvr>

</xml_diff>